<commit_message>
Added Date to the Presentation - Very End-Version
</commit_message>
<xml_diff>
--- a/07_Präsentation/Praesentation_LBS_in_Switzerland_v_pdf.pptx
+++ b/07_Präsentation/Praesentation_LBS_in_Switzerland_v_pdf.pptx
@@ -3616,7 +3616,11 @@
             </a:r>
             <a:r>
               <a:rPr lang="de-DE" dirty="0" smtClean="0"/>
-              <a:t> von Martin Moser &amp; Marc Rufer</a:t>
+              <a:t> von Martin Moser &amp; Marc </a:t>
+            </a:r>
+            <a:r>
+              <a:rPr lang="de-DE" dirty="0" smtClean="0"/>
+              <a:t>Rufer am 15.01.2013</a:t>
             </a:r>
             <a:endParaRPr lang="de-DE" dirty="0"/>
           </a:p>
@@ -3717,7 +3721,7 @@
           <a:graphicData uri="http://schemas.openxmlformats.org/presentationml/2006/ole">
             <mc:AlternateContent xmlns:mc="http://schemas.openxmlformats.org/markup-compatibility/2006">
               <mc:Choice xmlns:v="urn:schemas-microsoft-com:vml" Requires="v">
-                <p:oleObj spid="_x0000_s1041" name="Dokument" r:id="rId3" imgW="6121400" imgH="3276600" progId="Word.Document.12">
+                <p:oleObj spid="_x0000_s1044" name="Dokument" r:id="rId3" imgW="6121400" imgH="3276600" progId="Word.Document.12">
                   <p:link updateAutomatic="1"/>
                 </p:oleObj>
               </mc:Choice>
@@ -3848,7 +3852,7 @@
           <a:graphicData uri="http://schemas.openxmlformats.org/presentationml/2006/ole">
             <mc:AlternateContent xmlns:mc="http://schemas.openxmlformats.org/markup-compatibility/2006">
               <mc:Choice xmlns:v="urn:schemas-microsoft-com:vml" Requires="v">
-                <p:oleObj spid="_x0000_s2101" name="Dokument" r:id="rId3" imgW="9220200" imgH="3581400" progId="Word.Document.12">
+                <p:oleObj spid="_x0000_s2104" name="Dokument" r:id="rId3" imgW="9220200" imgH="3581400" progId="Word.Document.12">
                   <p:link updateAutomatic="1"/>
                 </p:oleObj>
               </mc:Choice>

</xml_diff>